<commit_message>
knn, model eval slide updates
</commit_message>
<xml_diff>
--- a/slides/06_naive_bayes.pptx
+++ b/slides/06_naive_bayes.pptx
@@ -216,7 +216,7 @@
           <a:p>
             <a:fld id="{3DB912AD-EA73-9140-98FC-984EB544AB7A}" type="datetimeFigureOut">
               <a:rPr lang="en-US" smtClean="0"/>
-              <a:t>8/5/18</a:t>
+              <a:t>9/29/18</a:t>
             </a:fld>
             <a:endParaRPr lang="en-US"/>
           </a:p>
@@ -2128,7 +2128,7 @@
           <a:p>
             <a:fld id="{02CE11C6-247B-0242-8651-D958C13D6FF0}" type="datetimeFigureOut">
               <a:rPr lang="en-US" smtClean="0"/>
-              <a:t>8/5/18</a:t>
+              <a:t>9/29/18</a:t>
             </a:fld>
             <a:endParaRPr lang="en-US"/>
           </a:p>
@@ -2356,7 +2356,7 @@
           <a:p>
             <a:fld id="{02CE11C6-247B-0242-8651-D958C13D6FF0}" type="datetimeFigureOut">
               <a:rPr lang="en-US" smtClean="0"/>
-              <a:t>8/5/18</a:t>
+              <a:t>9/29/18</a:t>
             </a:fld>
             <a:endParaRPr lang="en-US"/>
           </a:p>
@@ -2564,7 +2564,7 @@
           <a:p>
             <a:fld id="{02CE11C6-247B-0242-8651-D958C13D6FF0}" type="datetimeFigureOut">
               <a:rPr lang="en-US" smtClean="0"/>
-              <a:t>8/5/18</a:t>
+              <a:t>9/29/18</a:t>
             </a:fld>
             <a:endParaRPr lang="en-US"/>
           </a:p>
@@ -3029,7 +3029,7 @@
           <a:p>
             <a:fld id="{02CE11C6-247B-0242-8651-D958C13D6FF0}" type="datetimeFigureOut">
               <a:rPr lang="en-US" smtClean="0"/>
-              <a:t>8/5/18</a:t>
+              <a:t>9/29/18</a:t>
             </a:fld>
             <a:endParaRPr lang="en-US"/>
           </a:p>
@@ -3304,7 +3304,7 @@
           <a:p>
             <a:fld id="{02CE11C6-247B-0242-8651-D958C13D6FF0}" type="datetimeFigureOut">
               <a:rPr lang="en-US" smtClean="0"/>
-              <a:t>8/5/18</a:t>
+              <a:t>9/29/18</a:t>
             </a:fld>
             <a:endParaRPr lang="en-US"/>
           </a:p>
@@ -3569,7 +3569,7 @@
           <a:p>
             <a:fld id="{02CE11C6-247B-0242-8651-D958C13D6FF0}" type="datetimeFigureOut">
               <a:rPr lang="en-US" smtClean="0"/>
-              <a:t>8/5/18</a:t>
+              <a:t>9/29/18</a:t>
             </a:fld>
             <a:endParaRPr lang="en-US"/>
           </a:p>
@@ -3981,7 +3981,7 @@
           <a:p>
             <a:fld id="{02CE11C6-247B-0242-8651-D958C13D6FF0}" type="datetimeFigureOut">
               <a:rPr lang="en-US" smtClean="0"/>
-              <a:t>8/5/18</a:t>
+              <a:t>9/29/18</a:t>
             </a:fld>
             <a:endParaRPr lang="en-US"/>
           </a:p>
@@ -4122,7 +4122,7 @@
           <a:p>
             <a:fld id="{02CE11C6-247B-0242-8651-D958C13D6FF0}" type="datetimeFigureOut">
               <a:rPr lang="en-US" smtClean="0"/>
-              <a:t>8/5/18</a:t>
+              <a:t>9/29/18</a:t>
             </a:fld>
             <a:endParaRPr lang="en-US"/>
           </a:p>
@@ -4235,7 +4235,7 @@
           <a:p>
             <a:fld id="{02CE11C6-247B-0242-8651-D958C13D6FF0}" type="datetimeFigureOut">
               <a:rPr lang="en-US" smtClean="0"/>
-              <a:t>8/5/18</a:t>
+              <a:t>9/29/18</a:t>
             </a:fld>
             <a:endParaRPr lang="en-US"/>
           </a:p>
@@ -4546,7 +4546,7 @@
           <a:p>
             <a:fld id="{02CE11C6-247B-0242-8651-D958C13D6FF0}" type="datetimeFigureOut">
               <a:rPr lang="en-US" smtClean="0"/>
-              <a:t>8/5/18</a:t>
+              <a:t>9/29/18</a:t>
             </a:fld>
             <a:endParaRPr lang="en-US"/>
           </a:p>
@@ -4834,7 +4834,7 @@
           <a:p>
             <a:fld id="{02CE11C6-247B-0242-8651-D958C13D6FF0}" type="datetimeFigureOut">
               <a:rPr lang="en-US" smtClean="0"/>
-              <a:t>8/5/18</a:t>
+              <a:t>9/29/18</a:t>
             </a:fld>
             <a:endParaRPr lang="en-US"/>
           </a:p>
@@ -5075,7 +5075,7 @@
           <a:p>
             <a:fld id="{02CE11C6-247B-0242-8651-D958C13D6FF0}" type="datetimeFigureOut">
               <a:rPr lang="en-US" smtClean="0"/>
-              <a:t>8/5/18</a:t>
+              <a:t>9/29/18</a:t>
             </a:fld>
             <a:endParaRPr lang="en-US"/>
           </a:p>
@@ -9841,6 +9841,46 @@
             <a:r>
               <a:rPr lang="en-US" cap="none" dirty="0"/>
               <a:t>Bayesian Network</a:t>
+            </a:r>
+          </a:p>
+        </p:txBody>
+      </p:sp>
+      <p:sp>
+        <p:nvSpPr>
+          <p:cNvPr id="2" name="TextBox 1">
+            <a:extLst>
+              <a:ext uri="{FF2B5EF4-FFF2-40B4-BE49-F238E27FC236}">
+                <a16:creationId xmlns:a16="http://schemas.microsoft.com/office/drawing/2014/main" id="{3F4475CB-D124-3047-BF34-68745907244C}"/>
+              </a:ext>
+            </a:extLst>
+          </p:cNvPr>
+          <p:cNvSpPr txBox="1"/>
+          <p:nvPr/>
+        </p:nvSpPr>
+        <p:spPr>
+          <a:xfrm>
+            <a:off x="4133589" y="1991638"/>
+            <a:ext cx="2845651" cy="369332"/>
+          </a:xfrm>
+          <a:prstGeom prst="rect">
+            <a:avLst/>
+          </a:prstGeom>
+          <a:noFill/>
+          <a:ln>
+            <a:solidFill>
+              <a:srgbClr val="FF0000"/>
+            </a:solidFill>
+          </a:ln>
+        </p:spPr>
+        <p:txBody>
+          <a:bodyPr wrap="none" rtlCol="0">
+            <a:spAutoFit/>
+          </a:bodyPr>
+          <a:lstStyle/>
+          <a:p>
+            <a:r>
+              <a:rPr lang="en-US" dirty="0"/>
+              <a:t>See Machine Learning Slides</a:t>
             </a:r>
           </a:p>
         </p:txBody>

</xml_diff>

<commit_message>
bagging, randomforests, boosting slides, notebook, outline update
</commit_message>
<xml_diff>
--- a/slides/06_naive_bayes.pptx
+++ b/slides/06_naive_bayes.pptx
@@ -216,7 +216,7 @@
           <a:p>
             <a:fld id="{3DB912AD-EA73-9140-98FC-984EB544AB7A}" type="datetimeFigureOut">
               <a:rPr lang="en-US" smtClean="0"/>
-              <a:t>9/29/18</a:t>
+              <a:t>10/24/18</a:t>
             </a:fld>
             <a:endParaRPr lang="en-US"/>
           </a:p>
@@ -2128,7 +2128,7 @@
           <a:p>
             <a:fld id="{02CE11C6-247B-0242-8651-D958C13D6FF0}" type="datetimeFigureOut">
               <a:rPr lang="en-US" smtClean="0"/>
-              <a:t>9/29/18</a:t>
+              <a:t>10/24/18</a:t>
             </a:fld>
             <a:endParaRPr lang="en-US"/>
           </a:p>
@@ -2356,7 +2356,7 @@
           <a:p>
             <a:fld id="{02CE11C6-247B-0242-8651-D958C13D6FF0}" type="datetimeFigureOut">
               <a:rPr lang="en-US" smtClean="0"/>
-              <a:t>9/29/18</a:t>
+              <a:t>10/24/18</a:t>
             </a:fld>
             <a:endParaRPr lang="en-US"/>
           </a:p>
@@ -2564,7 +2564,7 @@
           <a:p>
             <a:fld id="{02CE11C6-247B-0242-8651-D958C13D6FF0}" type="datetimeFigureOut">
               <a:rPr lang="en-US" smtClean="0"/>
-              <a:t>9/29/18</a:t>
+              <a:t>10/24/18</a:t>
             </a:fld>
             <a:endParaRPr lang="en-US"/>
           </a:p>
@@ -3029,7 +3029,7 @@
           <a:p>
             <a:fld id="{02CE11C6-247B-0242-8651-D958C13D6FF0}" type="datetimeFigureOut">
               <a:rPr lang="en-US" smtClean="0"/>
-              <a:t>9/29/18</a:t>
+              <a:t>10/24/18</a:t>
             </a:fld>
             <a:endParaRPr lang="en-US"/>
           </a:p>
@@ -3304,7 +3304,7 @@
           <a:p>
             <a:fld id="{02CE11C6-247B-0242-8651-D958C13D6FF0}" type="datetimeFigureOut">
               <a:rPr lang="en-US" smtClean="0"/>
-              <a:t>9/29/18</a:t>
+              <a:t>10/24/18</a:t>
             </a:fld>
             <a:endParaRPr lang="en-US"/>
           </a:p>
@@ -3569,7 +3569,7 @@
           <a:p>
             <a:fld id="{02CE11C6-247B-0242-8651-D958C13D6FF0}" type="datetimeFigureOut">
               <a:rPr lang="en-US" smtClean="0"/>
-              <a:t>9/29/18</a:t>
+              <a:t>10/24/18</a:t>
             </a:fld>
             <a:endParaRPr lang="en-US"/>
           </a:p>
@@ -3981,7 +3981,7 @@
           <a:p>
             <a:fld id="{02CE11C6-247B-0242-8651-D958C13D6FF0}" type="datetimeFigureOut">
               <a:rPr lang="en-US" smtClean="0"/>
-              <a:t>9/29/18</a:t>
+              <a:t>10/24/18</a:t>
             </a:fld>
             <a:endParaRPr lang="en-US"/>
           </a:p>
@@ -4122,7 +4122,7 @@
           <a:p>
             <a:fld id="{02CE11C6-247B-0242-8651-D958C13D6FF0}" type="datetimeFigureOut">
               <a:rPr lang="en-US" smtClean="0"/>
-              <a:t>9/29/18</a:t>
+              <a:t>10/24/18</a:t>
             </a:fld>
             <a:endParaRPr lang="en-US"/>
           </a:p>
@@ -4235,7 +4235,7 @@
           <a:p>
             <a:fld id="{02CE11C6-247B-0242-8651-D958C13D6FF0}" type="datetimeFigureOut">
               <a:rPr lang="en-US" smtClean="0"/>
-              <a:t>9/29/18</a:t>
+              <a:t>10/24/18</a:t>
             </a:fld>
             <a:endParaRPr lang="en-US"/>
           </a:p>
@@ -4546,7 +4546,7 @@
           <a:p>
             <a:fld id="{02CE11C6-247B-0242-8651-D958C13D6FF0}" type="datetimeFigureOut">
               <a:rPr lang="en-US" smtClean="0"/>
-              <a:t>9/29/18</a:t>
+              <a:t>10/24/18</a:t>
             </a:fld>
             <a:endParaRPr lang="en-US"/>
           </a:p>
@@ -4834,7 +4834,7 @@
           <a:p>
             <a:fld id="{02CE11C6-247B-0242-8651-D958C13D6FF0}" type="datetimeFigureOut">
               <a:rPr lang="en-US" smtClean="0"/>
-              <a:t>9/29/18</a:t>
+              <a:t>10/24/18</a:t>
             </a:fld>
             <a:endParaRPr lang="en-US"/>
           </a:p>
@@ -5075,7 +5075,7 @@
           <a:p>
             <a:fld id="{02CE11C6-247B-0242-8651-D958C13D6FF0}" type="datetimeFigureOut">
               <a:rPr lang="en-US" smtClean="0"/>
-              <a:t>9/29/18</a:t>
+              <a:t>10/24/18</a:t>
             </a:fld>
             <a:endParaRPr lang="en-US"/>
           </a:p>
@@ -10018,8 +10018,8 @@
         </p:nvSpPr>
         <p:spPr>
           <a:xfrm>
-            <a:off x="5110554" y="1640584"/>
-            <a:ext cx="6626334" cy="4185761"/>
+            <a:off x="5110553" y="1651094"/>
+            <a:ext cx="6808177" cy="3754874"/>
           </a:xfrm>
           <a:prstGeom prst="rect">
             <a:avLst/>

</xml_diff>